<commit_message>
Overview of First App
</commit_message>
<xml_diff>
--- a/04_OverviewBasicApp/04_OverviewBasicApp.pptx
+++ b/04_OverviewBasicApp/04_OverviewBasicApp.pptx
@@ -3899,7 +3899,7 @@
               <a:rPr lang="en-US" sz="1600" dirty="0">
                 <a:hlinkClick r:id="rId2"/>
               </a:rPr>
-              <a:t>https://www.youtube.com/watch?v=4saN7GZnawU&amp;list=PL6gx4Cwl9DGBlmzzFcLgDhKTTfNLfX1IK&amp;index=3</a:t>
+              <a:t>https://www.youtube.com/watch?v=lcD0CDurxas&amp;list=PL6gx4Cwl9DGBlmzzFcLgDhKTTfNLfX1IK&amp;index=4</a:t>
             </a:r>
             <a:endParaRPr lang="en-US" sz="1600" dirty="0"/>
           </a:p>
@@ -4071,36 +4071,6 @@
       </p:sp>
       <p:sp>
         <p:nvSpPr>
-          <p:cNvPr id="3" name="副標題 2"/>
-          <p:cNvSpPr>
-            <a:spLocks noGrp="1"/>
-          </p:cNvSpPr>
-          <p:nvPr>
-            <p:ph type="subTitle" idx="1"/>
-          </p:nvPr>
-        </p:nvSpPr>
-        <p:spPr>
-          <a:xfrm>
-            <a:off x="1259632" y="4581128"/>
-            <a:ext cx="6400800" cy="694928"/>
-          </a:xfrm>
-        </p:spPr>
-        <p:txBody>
-          <a:bodyPr>
-            <a:normAutofit/>
-          </a:bodyPr>
-          <a:lstStyle/>
-          <a:p>
-            <a:r>
-              <a:rPr lang="en-US" altLang="zh-TW" dirty="0"/>
-              <a:t>Peter H. Chen</a:t>
-            </a:r>
-            <a:endParaRPr lang="zh-TW" altLang="en-US" dirty="0"/>
-          </a:p>
-        </p:txBody>
-      </p:sp>
-      <p:sp>
-        <p:nvSpPr>
           <p:cNvPr id="5" name="日期版面配置區 4"/>
           <p:cNvSpPr>
             <a:spLocks noGrp="1"/>
@@ -4388,7 +4358,7 @@
               <a:rPr lang="en-US" sz="1600" dirty="0">
                 <a:hlinkClick r:id="rId2"/>
               </a:rPr>
-              <a:t>https://www.youtube.com/watch?v=4saN7GZnawU&amp;list=PL6gx4Cwl9DGBlmzzFcLgDhKTTfNLfX1IK&amp;index=3</a:t>
+              <a:t>https://www.youtube.com/watch?v=lcD0CDurxas&amp;list=PL6gx4Cwl9DGBlmzzFcLgDhKTTfNLfX1IK&amp;index=4</a:t>
             </a:r>
             <a:endParaRPr lang="en-US" sz="1600" dirty="0"/>
           </a:p>
@@ -4560,36 +4530,6 @@
       </p:sp>
       <p:sp>
         <p:nvSpPr>
-          <p:cNvPr id="3" name="副標題 2"/>
-          <p:cNvSpPr>
-            <a:spLocks noGrp="1"/>
-          </p:cNvSpPr>
-          <p:nvPr>
-            <p:ph type="subTitle" idx="1"/>
-          </p:nvPr>
-        </p:nvSpPr>
-        <p:spPr>
-          <a:xfrm>
-            <a:off x="1259632" y="4581128"/>
-            <a:ext cx="6400800" cy="694928"/>
-          </a:xfrm>
-        </p:spPr>
-        <p:txBody>
-          <a:bodyPr>
-            <a:normAutofit/>
-          </a:bodyPr>
-          <a:lstStyle/>
-          <a:p>
-            <a:r>
-              <a:rPr lang="en-US" altLang="zh-TW" dirty="0"/>
-              <a:t>Peter H. Chen</a:t>
-            </a:r>
-            <a:endParaRPr lang="zh-TW" altLang="en-US" dirty="0"/>
-          </a:p>
-        </p:txBody>
-      </p:sp>
-      <p:sp>
-        <p:nvSpPr>
           <p:cNvPr id="5" name="日期版面配置區 4"/>
           <p:cNvSpPr>
             <a:spLocks noGrp="1"/>
@@ -4921,7 +4861,7 @@
               <a:rPr lang="en-US" sz="1600" dirty="0">
                 <a:hlinkClick r:id="rId2"/>
               </a:rPr>
-              <a:t>https://www.youtube.com/watch?v=4saN7GZnawU&amp;list=PL6gx4Cwl9DGBlmzzFcLgDhKTTfNLfX1IK&amp;index=3</a:t>
+              <a:t>https://www.youtube.com/watch?v=lcD0CDurxas&amp;list=PL6gx4Cwl9DGBlmzzFcLgDhKTTfNLfX1IK&amp;index=4</a:t>
             </a:r>
             <a:endParaRPr lang="en-US" sz="1600" dirty="0"/>
           </a:p>
@@ -5540,7 +5480,7 @@
               <a:rPr lang="en-US" sz="1600" dirty="0">
                 <a:hlinkClick r:id="rId2"/>
               </a:rPr>
-              <a:t>https://www.youtube.com/watch?v=4saN7GZnawU&amp;list=PL6gx4Cwl9DGBlmzzFcLgDhKTTfNLfX1IK&amp;index=3</a:t>
+              <a:t>https://www.youtube.com/watch?v=lcD0CDurxas&amp;list=PL6gx4Cwl9DGBlmzzFcLgDhKTTfNLfX1IK&amp;index=4</a:t>
             </a:r>
             <a:endParaRPr lang="en-US" sz="1600" dirty="0"/>
           </a:p>
@@ -5702,36 +5642,6 @@
                 <a:srgbClr val="FFFF00"/>
               </a:solidFill>
             </a:endParaRPr>
-          </a:p>
-        </p:txBody>
-      </p:sp>
-      <p:sp>
-        <p:nvSpPr>
-          <p:cNvPr id="3" name="副標題 2"/>
-          <p:cNvSpPr>
-            <a:spLocks noGrp="1"/>
-          </p:cNvSpPr>
-          <p:nvPr>
-            <p:ph type="subTitle" idx="1"/>
-          </p:nvPr>
-        </p:nvSpPr>
-        <p:spPr>
-          <a:xfrm>
-            <a:off x="1259632" y="4581128"/>
-            <a:ext cx="6400800" cy="694928"/>
-          </a:xfrm>
-        </p:spPr>
-        <p:txBody>
-          <a:bodyPr>
-            <a:normAutofit/>
-          </a:bodyPr>
-          <a:lstStyle/>
-          <a:p>
-            <a:r>
-              <a:rPr lang="en-US" altLang="zh-TW" dirty="0"/>
-              <a:t>Peter H. Chen</a:t>
-            </a:r>
-            <a:endParaRPr lang="zh-TW" altLang="en-US" dirty="0"/>
           </a:p>
         </p:txBody>
       </p:sp>
@@ -6060,7 +5970,7 @@
               <a:rPr lang="en-US" sz="1600" dirty="0">
                 <a:hlinkClick r:id="rId2"/>
               </a:rPr>
-              <a:t>https://www.youtube.com/watch?v=4saN7GZnawU&amp;list=PL6gx4Cwl9DGBlmzzFcLgDhKTTfNLfX1IK&amp;index=3</a:t>
+              <a:t>https://www.youtube.com/watch?v=lcD0CDurxas&amp;list=PL6gx4Cwl9DGBlmzzFcLgDhKTTfNLfX1IK&amp;index=4</a:t>
             </a:r>
             <a:endParaRPr lang="en-US" sz="1600" dirty="0"/>
           </a:p>
@@ -6232,36 +6142,6 @@
       </p:sp>
       <p:sp>
         <p:nvSpPr>
-          <p:cNvPr id="3" name="副標題 2"/>
-          <p:cNvSpPr>
-            <a:spLocks noGrp="1"/>
-          </p:cNvSpPr>
-          <p:nvPr>
-            <p:ph type="subTitle" idx="1"/>
-          </p:nvPr>
-        </p:nvSpPr>
-        <p:spPr>
-          <a:xfrm>
-            <a:off x="1259632" y="4581128"/>
-            <a:ext cx="6400800" cy="694928"/>
-          </a:xfrm>
-        </p:spPr>
-        <p:txBody>
-          <a:bodyPr>
-            <a:normAutofit/>
-          </a:bodyPr>
-          <a:lstStyle/>
-          <a:p>
-            <a:r>
-              <a:rPr lang="en-US" altLang="zh-TW" dirty="0"/>
-              <a:t>Peter H. Chen</a:t>
-            </a:r>
-            <a:endParaRPr lang="zh-TW" altLang="en-US" dirty="0"/>
-          </a:p>
-        </p:txBody>
-      </p:sp>
-      <p:sp>
-        <p:nvSpPr>
           <p:cNvPr id="5" name="日期版面配置區 4"/>
           <p:cNvSpPr>
             <a:spLocks noGrp="1"/>
@@ -6549,7 +6429,7 @@
               <a:rPr lang="en-US" sz="1600" dirty="0">
                 <a:hlinkClick r:id="rId2"/>
               </a:rPr>
-              <a:t>https://www.youtube.com/watch?v=4saN7GZnawU&amp;list=PL6gx4Cwl9DGBlmzzFcLgDhKTTfNLfX1IK&amp;index=3</a:t>
+              <a:t>https://www.youtube.com/watch?v=lcD0CDurxas&amp;list=PL6gx4Cwl9DGBlmzzFcLgDhKTTfNLfX1IK&amp;index=4</a:t>
             </a:r>
             <a:endParaRPr lang="en-US" sz="1600" dirty="0"/>
           </a:p>
@@ -6721,36 +6601,6 @@
       </p:sp>
       <p:sp>
         <p:nvSpPr>
-          <p:cNvPr id="3" name="副標題 2"/>
-          <p:cNvSpPr>
-            <a:spLocks noGrp="1"/>
-          </p:cNvSpPr>
-          <p:nvPr>
-            <p:ph type="subTitle" idx="1"/>
-          </p:nvPr>
-        </p:nvSpPr>
-        <p:spPr>
-          <a:xfrm>
-            <a:off x="1259632" y="4581128"/>
-            <a:ext cx="6400800" cy="694928"/>
-          </a:xfrm>
-        </p:spPr>
-        <p:txBody>
-          <a:bodyPr>
-            <a:normAutofit/>
-          </a:bodyPr>
-          <a:lstStyle/>
-          <a:p>
-            <a:r>
-              <a:rPr lang="en-US" altLang="zh-TW" dirty="0"/>
-              <a:t>Peter H. Chen</a:t>
-            </a:r>
-            <a:endParaRPr lang="zh-TW" altLang="en-US" dirty="0"/>
-          </a:p>
-        </p:txBody>
-      </p:sp>
-      <p:sp>
-        <p:nvSpPr>
           <p:cNvPr id="5" name="日期版面配置區 4"/>
           <p:cNvSpPr>
             <a:spLocks noGrp="1"/>
@@ -7074,7 +6924,7 @@
               <a:rPr lang="en-US" sz="1600" dirty="0">
                 <a:hlinkClick r:id="rId2"/>
               </a:rPr>
-              <a:t>https://www.youtube.com/watch?v=4saN7GZnawU&amp;list=PL6gx4Cwl9DGBlmzzFcLgDhKTTfNLfX1IK&amp;index=3</a:t>
+              <a:t>https://www.youtube.com/watch?v=lcD0CDurxas&amp;list=PL6gx4Cwl9DGBlmzzFcLgDhKTTfNLfX1IK&amp;index=4</a:t>
             </a:r>
             <a:endParaRPr lang="en-US" sz="1600" dirty="0"/>
           </a:p>
@@ -7241,36 +7091,6 @@
                 <a:srgbClr val="FFFF00"/>
               </a:solidFill>
             </a:endParaRPr>
-          </a:p>
-        </p:txBody>
-      </p:sp>
-      <p:sp>
-        <p:nvSpPr>
-          <p:cNvPr id="3" name="副標題 2"/>
-          <p:cNvSpPr>
-            <a:spLocks noGrp="1"/>
-          </p:cNvSpPr>
-          <p:nvPr>
-            <p:ph type="subTitle" idx="1"/>
-          </p:nvPr>
-        </p:nvSpPr>
-        <p:spPr>
-          <a:xfrm>
-            <a:off x="1259632" y="4581128"/>
-            <a:ext cx="6400800" cy="694928"/>
-          </a:xfrm>
-        </p:spPr>
-        <p:txBody>
-          <a:bodyPr>
-            <a:normAutofit/>
-          </a:bodyPr>
-          <a:lstStyle/>
-          <a:p>
-            <a:r>
-              <a:rPr lang="en-US" altLang="zh-TW" dirty="0"/>
-              <a:t>Peter H. Chen</a:t>
-            </a:r>
-            <a:endParaRPr lang="zh-TW" altLang="en-US" dirty="0"/>
           </a:p>
         </p:txBody>
       </p:sp>

</xml_diff>